<commit_message>
more minor changes to presentation
</commit_message>
<xml_diff>
--- a/Apigee_Glass.pptx
+++ b/Apigee_Glass.pptx
@@ -15,7 +15,7 @@
     <p:sldId id="266" r:id="rId9"/>
     <p:sldId id="259" r:id="rId10"/>
     <p:sldId id="263" r:id="rId11"/>
-    <p:sldId id="264" r:id="rId12"/>
+    <p:sldId id="267" r:id="rId12"/>
   </p:sldIdLst>
   <p:sldSz cx="9144000" cy="6858000" type="screen4x3"/>
   <p:notesSz cx="6858000" cy="9144000"/>
@@ -3379,41 +3379,79 @@
             <a:spLocks noGrp="1"/>
           </p:cNvSpPr>
           <p:nvPr>
-            <p:ph type="title"/>
-          </p:nvPr>
-        </p:nvSpPr>
-        <p:spPr/>
-        <p:txBody>
-          <a:bodyPr/>
-          <a:lstStyle/>
-          <a:p>
-            <a:endParaRPr lang="en-US"/>
-          </a:p>
-        </p:txBody>
-      </p:sp>
-      <p:sp>
-        <p:nvSpPr>
-          <p:cNvPr id="3" name="Content Placeholder 2"/>
-          <p:cNvSpPr>
-            <a:spLocks noGrp="1"/>
-          </p:cNvSpPr>
-          <p:nvPr>
-            <p:ph idx="1"/>
-          </p:nvPr>
-        </p:nvSpPr>
-        <p:spPr/>
-        <p:txBody>
-          <a:bodyPr/>
-          <a:lstStyle/>
-          <a:p>
-            <a:endParaRPr lang="en-US"/>
+            <p:ph type="ctrTitle"/>
+          </p:nvPr>
+        </p:nvSpPr>
+        <p:spPr>
+          <a:xfrm>
+            <a:off x="685800" y="2593474"/>
+            <a:ext cx="7772400" cy="1006976"/>
+          </a:xfrm>
+        </p:spPr>
+        <p:txBody>
+          <a:bodyPr/>
+          <a:lstStyle/>
+          <a:p>
+            <a:pPr algn="r"/>
+            <a:r>
+              <a:rPr lang="da-DK" dirty="0" smtClean="0"/>
+              <a:t>Q&amp;A</a:t>
+            </a:r>
+            <a:endParaRPr lang="en-US" dirty="0"/>
+          </a:p>
+        </p:txBody>
+      </p:sp>
+      <p:sp>
+        <p:nvSpPr>
+          <p:cNvPr id="4" name="TextBox 3"/>
+          <p:cNvSpPr txBox="1"/>
+          <p:nvPr/>
+        </p:nvSpPr>
+        <p:spPr>
+          <a:xfrm>
+            <a:off x="5666074" y="5786202"/>
+            <a:ext cx="2792126" cy="646331"/>
+          </a:xfrm>
+          <a:prstGeom prst="rect">
+            <a:avLst/>
+          </a:prstGeom>
+          <a:noFill/>
+        </p:spPr>
+        <p:txBody>
+          <a:bodyPr wrap="none" rtlCol="0">
+            <a:spAutoFit/>
+          </a:bodyPr>
+          <a:lstStyle/>
+          <a:p>
+            <a:pPr algn="r"/>
+            <a:r>
+              <a:rPr lang="en-US" dirty="0" smtClean="0"/>
+              <a:t>Brenda Jin @</a:t>
+            </a:r>
+            <a:r>
+              <a:rPr lang="en-US" dirty="0" err="1" smtClean="0"/>
+              <a:t>cyberneticlove</a:t>
+            </a:r>
+            <a:endParaRPr lang="en-US" dirty="0" smtClean="0"/>
+          </a:p>
+          <a:p>
+            <a:pPr algn="r"/>
+            <a:r>
+              <a:rPr lang="en-US" dirty="0" smtClean="0"/>
+              <a:t>Developer, </a:t>
+            </a:r>
+            <a:r>
+              <a:rPr lang="en-US" dirty="0" err="1" smtClean="0"/>
+              <a:t>Macys.com</a:t>
+            </a:r>
+            <a:endParaRPr lang="en-US" dirty="0"/>
           </a:p>
         </p:txBody>
       </p:sp>
     </p:spTree>
     <p:extLst>
       <p:ext uri="{BB962C8B-B14F-4D97-AF65-F5344CB8AC3E}">
-        <p14:creationId xmlns:p14="http://schemas.microsoft.com/office/powerpoint/2010/main" val="3854602003"/>
+        <p14:creationId xmlns:p14="http://schemas.microsoft.com/office/powerpoint/2010/main" val="3426670732"/>
       </p:ext>
     </p:extLst>
   </p:cSld>
@@ -4158,8 +4196,13 @@
           <a:p>
             <a:r>
               <a:rPr lang="en-US" dirty="0" smtClean="0"/>
-              <a:t>GDK unveiled this week</a:t>
-            </a:r>
+              <a:t>GDK </a:t>
+            </a:r>
+            <a:r>
+              <a:rPr lang="en-US" smtClean="0"/>
+              <a:t>unveiled next week</a:t>
+            </a:r>
+            <a:endParaRPr lang="en-US" dirty="0" smtClean="0"/>
           </a:p>
           <a:p>
             <a:r>

</xml_diff>